<commit_message>
added an explicit formula for the contribution of sliding as a function of histone and DNA loss, and the chromatin conformation factor. The work is summarized in a short document and in the report.
</commit_message>
<xml_diff>
--- a/Documents/Report/Images/SlidingModel/2Darrangment.pptx
+++ b/Documents/Report/Images/SlidingModel/2Darrangment.pptx
@@ -6,6 +6,7 @@
   </p:sldMasterIdLst>
   <p:sldIdLst>
     <p:sldId id="256" r:id="rId2"/>
+    <p:sldId id="257" r:id="rId3"/>
   </p:sldIdLst>
   <p:sldSz cx="9144000" cy="6858000" type="screen4x3"/>
   <p:notesSz cx="6858000" cy="9144000"/>
@@ -104,6 +105,22 @@
       </a:defRPr>
     </a:lvl9pPr>
   </p:defaultTextStyle>
+  <p:extLst>
+    <p:ext uri="{EFAFB233-063F-42B5-8137-9DF3F51BA10A}">
+      <p15:sldGuideLst xmlns:p15="http://schemas.microsoft.com/office/powerpoint/2012/main">
+        <p15:guide id="1" orient="horz" pos="2160">
+          <p15:clr>
+            <a:srgbClr val="A4A3A4"/>
+          </p15:clr>
+        </p15:guide>
+        <p15:guide id="2" pos="2880">
+          <p15:clr>
+            <a:srgbClr val="A4A3A4"/>
+          </p15:clr>
+        </p15:guide>
+      </p15:sldGuideLst>
+    </p:ext>
+  </p:extLst>
 </p:presentation>
 </file>
 
@@ -288,7 +305,7 @@
           <a:p>
             <a:fld id="{8ED0BF8E-35AF-4831-8B77-5F561414D710}" type="datetimeFigureOut">
               <a:rPr lang="en-US" smtClean="0"/>
-              <a:t>9/4/2015</a:t>
+              <a:t>9/20/2015</a:t>
             </a:fld>
             <a:endParaRPr lang="en-US"/>
           </a:p>
@@ -458,7 +475,7 @@
           <a:p>
             <a:fld id="{8ED0BF8E-35AF-4831-8B77-5F561414D710}" type="datetimeFigureOut">
               <a:rPr lang="en-US" smtClean="0"/>
-              <a:t>9/4/2015</a:t>
+              <a:t>9/20/2015</a:t>
             </a:fld>
             <a:endParaRPr lang="en-US"/>
           </a:p>
@@ -638,7 +655,7 @@
           <a:p>
             <a:fld id="{8ED0BF8E-35AF-4831-8B77-5F561414D710}" type="datetimeFigureOut">
               <a:rPr lang="en-US" smtClean="0"/>
-              <a:t>9/4/2015</a:t>
+              <a:t>9/20/2015</a:t>
             </a:fld>
             <a:endParaRPr lang="en-US"/>
           </a:p>
@@ -808,7 +825,7 @@
           <a:p>
             <a:fld id="{8ED0BF8E-35AF-4831-8B77-5F561414D710}" type="datetimeFigureOut">
               <a:rPr lang="en-US" smtClean="0"/>
-              <a:t>9/4/2015</a:t>
+              <a:t>9/20/2015</a:t>
             </a:fld>
             <a:endParaRPr lang="en-US"/>
           </a:p>
@@ -1054,7 +1071,7 @@
           <a:p>
             <a:fld id="{8ED0BF8E-35AF-4831-8B77-5F561414D710}" type="datetimeFigureOut">
               <a:rPr lang="en-US" smtClean="0"/>
-              <a:t>9/4/2015</a:t>
+              <a:t>9/20/2015</a:t>
             </a:fld>
             <a:endParaRPr lang="en-US"/>
           </a:p>
@@ -1342,7 +1359,7 @@
           <a:p>
             <a:fld id="{8ED0BF8E-35AF-4831-8B77-5F561414D710}" type="datetimeFigureOut">
               <a:rPr lang="en-US" smtClean="0"/>
-              <a:t>9/4/2015</a:t>
+              <a:t>9/20/2015</a:t>
             </a:fld>
             <a:endParaRPr lang="en-US"/>
           </a:p>
@@ -1764,7 +1781,7 @@
           <a:p>
             <a:fld id="{8ED0BF8E-35AF-4831-8B77-5F561414D710}" type="datetimeFigureOut">
               <a:rPr lang="en-US" smtClean="0"/>
-              <a:t>9/4/2015</a:t>
+              <a:t>9/20/2015</a:t>
             </a:fld>
             <a:endParaRPr lang="en-US"/>
           </a:p>
@@ -1882,7 +1899,7 @@
           <a:p>
             <a:fld id="{8ED0BF8E-35AF-4831-8B77-5F561414D710}" type="datetimeFigureOut">
               <a:rPr lang="en-US" smtClean="0"/>
-              <a:t>9/4/2015</a:t>
+              <a:t>9/20/2015</a:t>
             </a:fld>
             <a:endParaRPr lang="en-US"/>
           </a:p>
@@ -1977,7 +1994,7 @@
           <a:p>
             <a:fld id="{8ED0BF8E-35AF-4831-8B77-5F561414D710}" type="datetimeFigureOut">
               <a:rPr lang="en-US" smtClean="0"/>
-              <a:t>9/4/2015</a:t>
+              <a:t>9/20/2015</a:t>
             </a:fld>
             <a:endParaRPr lang="en-US"/>
           </a:p>
@@ -2254,7 +2271,7 @@
           <a:p>
             <a:fld id="{8ED0BF8E-35AF-4831-8B77-5F561414D710}" type="datetimeFigureOut">
               <a:rPr lang="en-US" smtClean="0"/>
-              <a:t>9/4/2015</a:t>
+              <a:t>9/20/2015</a:t>
             </a:fld>
             <a:endParaRPr lang="en-US"/>
           </a:p>
@@ -2507,7 +2524,7 @@
           <a:p>
             <a:fld id="{8ED0BF8E-35AF-4831-8B77-5F561414D710}" type="datetimeFigureOut">
               <a:rPr lang="en-US" smtClean="0"/>
-              <a:t>9/4/2015</a:t>
+              <a:t>9/20/2015</a:t>
             </a:fld>
             <a:endParaRPr lang="en-US"/>
           </a:p>
@@ -2720,7 +2737,7 @@
           <a:p>
             <a:fld id="{8ED0BF8E-35AF-4831-8B77-5F561414D710}" type="datetimeFigureOut">
               <a:rPr lang="en-US" smtClean="0"/>
-              <a:t>9/4/2015</a:t>
+              <a:t>9/20/2015</a:t>
             </a:fld>
             <a:endParaRPr lang="en-US"/>
           </a:p>
@@ -3743,11 +3760,6 @@
               </a:rPr>
               <a:t>r</a:t>
             </a:r>
-            <a:endParaRPr lang="en-US" dirty="0">
-              <a:solidFill>
-                <a:schemeClr val="bg1"/>
-              </a:solidFill>
-            </a:endParaRPr>
           </a:p>
         </p:txBody>
       </p:sp>
@@ -8015,6 +8027,2134 @@
 </p:sld>
 </file>
 
+<file path=ppt/slides/slide2.xml><?xml version="1.0" encoding="utf-8"?>
+<p:sld xmlns:a="http://schemas.openxmlformats.org/drawingml/2006/main" xmlns:r="http://schemas.openxmlformats.org/officeDocument/2006/relationships" xmlns:p="http://schemas.openxmlformats.org/presentationml/2006/main">
+  <p:cSld>
+    <p:spTree>
+      <p:nvGrpSpPr>
+        <p:cNvPr id="1" name=""/>
+        <p:cNvGrpSpPr/>
+        <p:nvPr/>
+      </p:nvGrpSpPr>
+      <p:grpSpPr>
+        <a:xfrm>
+          <a:off x="0" y="0"/>
+          <a:ext cx="0" cy="0"/>
+          <a:chOff x="0" y="0"/>
+          <a:chExt cx="0" cy="0"/>
+        </a:xfrm>
+      </p:grpSpPr>
+      <p:grpSp>
+        <p:nvGrpSpPr>
+          <p:cNvPr id="45" name="Group 44"/>
+          <p:cNvGrpSpPr/>
+          <p:nvPr/>
+        </p:nvGrpSpPr>
+        <p:grpSpPr>
+          <a:xfrm>
+            <a:off x="1143000" y="751143"/>
+            <a:ext cx="5497033" cy="3164984"/>
+            <a:chOff x="1143000" y="370143"/>
+            <a:chExt cx="5497033" cy="3164984"/>
+          </a:xfrm>
+        </p:grpSpPr>
+        <p:grpSp>
+          <p:nvGrpSpPr>
+            <p:cNvPr id="33" name="Group 32"/>
+            <p:cNvGrpSpPr/>
+            <p:nvPr/>
+          </p:nvGrpSpPr>
+          <p:grpSpPr>
+            <a:xfrm>
+              <a:off x="1143000" y="370143"/>
+              <a:ext cx="5497033" cy="3164984"/>
+              <a:chOff x="1600200" y="2123226"/>
+              <a:chExt cx="3810000" cy="1458176"/>
+            </a:xfrm>
+          </p:grpSpPr>
+          <p:cxnSp>
+            <p:nvCxnSpPr>
+              <p:cNvPr id="6" name="Straight Connector 5"/>
+              <p:cNvCxnSpPr/>
+              <p:nvPr/>
+            </p:nvCxnSpPr>
+            <p:spPr>
+              <a:xfrm flipV="1">
+                <a:off x="1600200" y="3543300"/>
+                <a:ext cx="3810000" cy="38100"/>
+              </a:xfrm>
+              <a:prstGeom prst="line">
+                <a:avLst/>
+              </a:prstGeom>
+              <a:ln w="38100"/>
+            </p:spPr>
+            <p:style>
+              <a:lnRef idx="1">
+                <a:schemeClr val="accent1"/>
+              </a:lnRef>
+              <a:fillRef idx="0">
+                <a:schemeClr val="accent1"/>
+              </a:fillRef>
+              <a:effectRef idx="0">
+                <a:schemeClr val="accent1"/>
+              </a:effectRef>
+              <a:fontRef idx="minor">
+                <a:schemeClr val="tx1"/>
+              </a:fontRef>
+            </p:style>
+          </p:cxnSp>
+          <p:cxnSp>
+            <p:nvCxnSpPr>
+              <p:cNvPr id="8" name="Straight Connector 7"/>
+              <p:cNvCxnSpPr/>
+              <p:nvPr/>
+            </p:nvCxnSpPr>
+            <p:spPr>
+              <a:xfrm flipV="1">
+                <a:off x="1603414" y="2133600"/>
+                <a:ext cx="1500088" cy="1447801"/>
+              </a:xfrm>
+              <a:prstGeom prst="line">
+                <a:avLst/>
+              </a:prstGeom>
+              <a:ln w="38100"/>
+            </p:spPr>
+            <p:style>
+              <a:lnRef idx="1">
+                <a:schemeClr val="accent1"/>
+              </a:lnRef>
+              <a:fillRef idx="0">
+                <a:schemeClr val="accent1"/>
+              </a:fillRef>
+              <a:effectRef idx="0">
+                <a:schemeClr val="accent1"/>
+              </a:effectRef>
+              <a:fontRef idx="minor">
+                <a:schemeClr val="tx1"/>
+              </a:fontRef>
+            </p:style>
+          </p:cxnSp>
+          <p:cxnSp>
+            <p:nvCxnSpPr>
+              <p:cNvPr id="12" name="Straight Connector 11"/>
+              <p:cNvCxnSpPr/>
+              <p:nvPr/>
+            </p:nvCxnSpPr>
+            <p:spPr>
+              <a:xfrm flipV="1">
+                <a:off x="1607545" y="2123226"/>
+                <a:ext cx="2203456" cy="1458176"/>
+              </a:xfrm>
+              <a:prstGeom prst="line">
+                <a:avLst/>
+              </a:prstGeom>
+              <a:ln w="38100"/>
+            </p:spPr>
+            <p:style>
+              <a:lnRef idx="1">
+                <a:schemeClr val="accent1"/>
+              </a:lnRef>
+              <a:fillRef idx="0">
+                <a:schemeClr val="accent1"/>
+              </a:fillRef>
+              <a:effectRef idx="0">
+                <a:schemeClr val="accent1"/>
+              </a:effectRef>
+              <a:fontRef idx="minor">
+                <a:schemeClr val="tx1"/>
+              </a:fontRef>
+            </p:style>
+          </p:cxnSp>
+          <p:cxnSp>
+            <p:nvCxnSpPr>
+              <p:cNvPr id="18" name="Straight Connector 17"/>
+              <p:cNvCxnSpPr/>
+              <p:nvPr/>
+            </p:nvCxnSpPr>
+            <p:spPr>
+              <a:xfrm flipV="1">
+                <a:off x="1607545" y="2286000"/>
+                <a:ext cx="2812055" cy="1295400"/>
+              </a:xfrm>
+              <a:prstGeom prst="line">
+                <a:avLst/>
+              </a:prstGeom>
+              <a:ln w="38100"/>
+            </p:spPr>
+            <p:style>
+              <a:lnRef idx="1">
+                <a:schemeClr val="accent1"/>
+              </a:lnRef>
+              <a:fillRef idx="0">
+                <a:schemeClr val="accent1"/>
+              </a:fillRef>
+              <a:effectRef idx="0">
+                <a:schemeClr val="accent1"/>
+              </a:effectRef>
+              <a:fontRef idx="minor">
+                <a:schemeClr val="tx1"/>
+              </a:fontRef>
+            </p:style>
+          </p:cxnSp>
+          <p:cxnSp>
+            <p:nvCxnSpPr>
+              <p:cNvPr id="25" name="Straight Connector 24"/>
+              <p:cNvCxnSpPr/>
+              <p:nvPr/>
+            </p:nvCxnSpPr>
+            <p:spPr>
+              <a:xfrm flipV="1">
+                <a:off x="1600200" y="2559963"/>
+                <a:ext cx="3375438" cy="1021437"/>
+              </a:xfrm>
+              <a:prstGeom prst="line">
+                <a:avLst/>
+              </a:prstGeom>
+              <a:ln w="38100"/>
+            </p:spPr>
+            <p:style>
+              <a:lnRef idx="1">
+                <a:schemeClr val="accent1"/>
+              </a:lnRef>
+              <a:fillRef idx="0">
+                <a:schemeClr val="accent1"/>
+              </a:fillRef>
+              <a:effectRef idx="0">
+                <a:schemeClr val="accent1"/>
+              </a:effectRef>
+              <a:fontRef idx="minor">
+                <a:schemeClr val="tx1"/>
+              </a:fontRef>
+            </p:style>
+          </p:cxnSp>
+          <p:cxnSp>
+            <p:nvCxnSpPr>
+              <p:cNvPr id="30" name="Straight Connector 29"/>
+              <p:cNvCxnSpPr/>
+              <p:nvPr/>
+            </p:nvCxnSpPr>
+            <p:spPr>
+              <a:xfrm flipV="1">
+                <a:off x="1600200" y="2971800"/>
+                <a:ext cx="3810000" cy="609600"/>
+              </a:xfrm>
+              <a:prstGeom prst="line">
+                <a:avLst/>
+              </a:prstGeom>
+              <a:ln w="38100"/>
+            </p:spPr>
+            <p:style>
+              <a:lnRef idx="1">
+                <a:schemeClr val="accent1"/>
+              </a:lnRef>
+              <a:fillRef idx="0">
+                <a:schemeClr val="accent1"/>
+              </a:fillRef>
+              <a:effectRef idx="0">
+                <a:schemeClr val="accent1"/>
+              </a:effectRef>
+              <a:fontRef idx="minor">
+                <a:schemeClr val="tx1"/>
+              </a:fontRef>
+            </p:style>
+          </p:cxnSp>
+        </p:grpSp>
+        <p:cxnSp>
+          <p:nvCxnSpPr>
+            <p:cNvPr id="36" name="Straight Connector 35"/>
+            <p:cNvCxnSpPr/>
+            <p:nvPr/>
+          </p:nvCxnSpPr>
+          <p:spPr>
+            <a:xfrm>
+              <a:off x="3276600" y="381000"/>
+              <a:ext cx="35350" cy="3112774"/>
+            </a:xfrm>
+            <a:prstGeom prst="line">
+              <a:avLst/>
+            </a:prstGeom>
+            <a:ln w="38100">
+              <a:prstDash val="sysDash"/>
+            </a:ln>
+          </p:spPr>
+          <p:style>
+            <a:lnRef idx="1">
+              <a:schemeClr val="accent1"/>
+            </a:lnRef>
+            <a:fillRef idx="0">
+              <a:schemeClr val="accent1"/>
+            </a:fillRef>
+            <a:effectRef idx="0">
+              <a:schemeClr val="accent1"/>
+            </a:effectRef>
+            <a:fontRef idx="minor">
+              <a:schemeClr val="tx1"/>
+            </a:fontRef>
+          </p:style>
+        </p:cxnSp>
+        <p:cxnSp>
+          <p:nvCxnSpPr>
+            <p:cNvPr id="37" name="Straight Connector 36"/>
+            <p:cNvCxnSpPr/>
+            <p:nvPr/>
+          </p:nvCxnSpPr>
+          <p:spPr>
+            <a:xfrm>
+              <a:off x="4312770" y="374824"/>
+              <a:ext cx="38277" cy="3118950"/>
+            </a:xfrm>
+            <a:prstGeom prst="line">
+              <a:avLst/>
+            </a:prstGeom>
+            <a:ln w="38100">
+              <a:prstDash val="sysDash"/>
+            </a:ln>
+          </p:spPr>
+          <p:style>
+            <a:lnRef idx="1">
+              <a:schemeClr val="accent1"/>
+            </a:lnRef>
+            <a:fillRef idx="0">
+              <a:schemeClr val="accent1"/>
+            </a:fillRef>
+            <a:effectRef idx="0">
+              <a:schemeClr val="accent1"/>
+            </a:effectRef>
+            <a:fontRef idx="minor">
+              <a:schemeClr val="tx1"/>
+            </a:fontRef>
+          </p:style>
+        </p:cxnSp>
+        <p:cxnSp>
+          <p:nvCxnSpPr>
+            <p:cNvPr id="38" name="Straight Connector 37"/>
+            <p:cNvCxnSpPr/>
+            <p:nvPr/>
+          </p:nvCxnSpPr>
+          <p:spPr>
+            <a:xfrm flipH="1">
+              <a:off x="5210804" y="723446"/>
+              <a:ext cx="918" cy="2770328"/>
+            </a:xfrm>
+            <a:prstGeom prst="line">
+              <a:avLst/>
+            </a:prstGeom>
+            <a:ln w="38100">
+              <a:prstDash val="sysDash"/>
+            </a:ln>
+          </p:spPr>
+          <p:style>
+            <a:lnRef idx="1">
+              <a:schemeClr val="accent1"/>
+            </a:lnRef>
+            <a:fillRef idx="0">
+              <a:schemeClr val="accent1"/>
+            </a:fillRef>
+            <a:effectRef idx="0">
+              <a:schemeClr val="accent1"/>
+            </a:effectRef>
+            <a:fontRef idx="minor">
+              <a:schemeClr val="tx1"/>
+            </a:fontRef>
+          </p:style>
+        </p:cxnSp>
+        <p:cxnSp>
+          <p:nvCxnSpPr>
+            <p:cNvPr id="39" name="Straight Connector 38"/>
+            <p:cNvCxnSpPr/>
+            <p:nvPr/>
+          </p:nvCxnSpPr>
+          <p:spPr>
+            <a:xfrm flipH="1">
+              <a:off x="5981982" y="1385015"/>
+              <a:ext cx="26208" cy="2108759"/>
+            </a:xfrm>
+            <a:prstGeom prst="line">
+              <a:avLst/>
+            </a:prstGeom>
+            <a:ln w="38100">
+              <a:prstDash val="sysDash"/>
+            </a:ln>
+          </p:spPr>
+          <p:style>
+            <a:lnRef idx="1">
+              <a:schemeClr val="accent1"/>
+            </a:lnRef>
+            <a:fillRef idx="0">
+              <a:schemeClr val="accent1"/>
+            </a:fillRef>
+            <a:effectRef idx="0">
+              <a:schemeClr val="accent1"/>
+            </a:effectRef>
+            <a:fontRef idx="minor">
+              <a:schemeClr val="tx1"/>
+            </a:fontRef>
+          </p:style>
+        </p:cxnSp>
+        <p:cxnSp>
+          <p:nvCxnSpPr>
+            <p:cNvPr id="40" name="Straight Connector 39"/>
+            <p:cNvCxnSpPr/>
+            <p:nvPr/>
+          </p:nvCxnSpPr>
+          <p:spPr>
+            <a:xfrm>
+              <a:off x="6640033" y="2211981"/>
+              <a:ext cx="0" cy="1240445"/>
+            </a:xfrm>
+            <a:prstGeom prst="line">
+              <a:avLst/>
+            </a:prstGeom>
+            <a:ln w="38100">
+              <a:prstDash val="dash"/>
+            </a:ln>
+          </p:spPr>
+          <p:style>
+            <a:lnRef idx="1">
+              <a:schemeClr val="accent1"/>
+            </a:lnRef>
+            <a:fillRef idx="0">
+              <a:schemeClr val="accent1"/>
+            </a:fillRef>
+            <a:effectRef idx="0">
+              <a:schemeClr val="accent1"/>
+            </a:effectRef>
+            <a:fontRef idx="minor">
+              <a:schemeClr val="tx1"/>
+            </a:fontRef>
+          </p:style>
+        </p:cxnSp>
+      </p:grpSp>
+      <mc:AlternateContent xmlns:mc="http://schemas.openxmlformats.org/markup-compatibility/2006">
+        <mc:Choice xmlns:a14="http://schemas.microsoft.com/office/drawing/2010/main" Requires="a14">
+          <p:sp>
+            <p:nvSpPr>
+              <p:cNvPr id="46" name="TextBox 45"/>
+              <p:cNvSpPr txBox="1"/>
+              <p:nvPr/>
+            </p:nvSpPr>
+            <p:spPr>
+              <a:xfrm>
+                <a:off x="3048000" y="4215825"/>
+                <a:ext cx="533400" cy="584775"/>
+              </a:xfrm>
+              <a:prstGeom prst="rect">
+                <a:avLst/>
+              </a:prstGeom>
+              <a:noFill/>
+            </p:spPr>
+            <p:txBody>
+              <a:bodyPr wrap="square" rtlCol="0">
+                <a:spAutoFit/>
+              </a:bodyPr>
+              <a:lstStyle/>
+              <a:p>
+                <a14:m>
+                  <m:oMathPara xmlns:m="http://schemas.openxmlformats.org/officeDocument/2006/math">
+                    <m:oMathParaPr>
+                      <m:jc m:val="centerGroup"/>
+                    </m:oMathParaPr>
+                    <m:oMath xmlns:m="http://schemas.openxmlformats.org/officeDocument/2006/math">
+                      <m:sSub>
+                        <m:sSubPr>
+                          <m:ctrlPr>
+                            <a:rPr lang="en-US" sz="3200" i="1" dirty="0" smtClean="0">
+                              <a:latin typeface="Cambria Math" panose="02040503050406030204" pitchFamily="18" charset="0"/>
+                            </a:rPr>
+                          </m:ctrlPr>
+                        </m:sSubPr>
+                        <m:e>
+                          <m:r>
+                            <a:rPr lang="en-US" sz="3200" b="0" i="1" dirty="0" smtClean="0">
+                              <a:latin typeface="Cambria Math" panose="02040503050406030204" pitchFamily="18" charset="0"/>
+                            </a:rPr>
+                            <m:t>𝐿</m:t>
+                          </m:r>
+                        </m:e>
+                        <m:sub>
+                          <m:r>
+                            <a:rPr lang="en-US" sz="3200" b="0" i="1" dirty="0" smtClean="0">
+                              <a:latin typeface="Cambria Math" panose="02040503050406030204" pitchFamily="18" charset="0"/>
+                            </a:rPr>
+                            <m:t>1</m:t>
+                          </m:r>
+                        </m:sub>
+                      </m:sSub>
+                    </m:oMath>
+                  </m:oMathPara>
+                </a14:m>
+                <a:endParaRPr lang="en-US" sz="3200" dirty="0"/>
+              </a:p>
+            </p:txBody>
+          </p:sp>
+        </mc:Choice>
+        <mc:Fallback>
+          <p:sp>
+            <p:nvSpPr>
+              <p:cNvPr id="46" name="TextBox 45"/>
+              <p:cNvSpPr txBox="1">
+                <a:spLocks noRot="1" noChangeAspect="1" noMove="1" noResize="1" noEditPoints="1" noAdjustHandles="1" noChangeArrowheads="1" noChangeShapeType="1" noTextEdit="1"/>
+              </p:cNvSpPr>
+              <p:nvPr/>
+            </p:nvSpPr>
+            <p:spPr>
+              <a:xfrm>
+                <a:off x="3048000" y="4215825"/>
+                <a:ext cx="533400" cy="584775"/>
+              </a:xfrm>
+              <a:prstGeom prst="rect">
+                <a:avLst/>
+              </a:prstGeom>
+              <a:blipFill rotWithShape="0">
+                <a:blip r:embed="rId2"/>
+                <a:stretch>
+                  <a:fillRect/>
+                </a:stretch>
+              </a:blipFill>
+            </p:spPr>
+            <p:txBody>
+              <a:bodyPr/>
+              <a:lstStyle/>
+              <a:p>
+                <a:r>
+                  <a:rPr lang="en-US">
+                    <a:noFill/>
+                  </a:rPr>
+                  <a:t> </a:t>
+                </a:r>
+              </a:p>
+            </p:txBody>
+          </p:sp>
+        </mc:Fallback>
+      </mc:AlternateContent>
+      <p:sp>
+        <p:nvSpPr>
+          <p:cNvPr id="48" name="Oval 47"/>
+          <p:cNvSpPr/>
+          <p:nvPr/>
+        </p:nvSpPr>
+        <p:spPr>
+          <a:xfrm>
+            <a:off x="3182200" y="685800"/>
+            <a:ext cx="246800" cy="228600"/>
+          </a:xfrm>
+          <a:prstGeom prst="ellipse">
+            <a:avLst/>
+          </a:prstGeom>
+          <a:solidFill>
+            <a:schemeClr val="accent3">
+              <a:lumMod val="60000"/>
+              <a:lumOff val="40000"/>
+            </a:schemeClr>
+          </a:solidFill>
+        </p:spPr>
+        <p:style>
+          <a:lnRef idx="2">
+            <a:schemeClr val="accent1">
+              <a:shade val="50000"/>
+            </a:schemeClr>
+          </a:lnRef>
+          <a:fillRef idx="1">
+            <a:schemeClr val="accent1"/>
+          </a:fillRef>
+          <a:effectRef idx="0">
+            <a:schemeClr val="accent1"/>
+          </a:effectRef>
+          <a:fontRef idx="minor">
+            <a:schemeClr val="lt1"/>
+          </a:fontRef>
+        </p:style>
+        <p:txBody>
+          <a:bodyPr rtlCol="0" anchor="ctr"/>
+          <a:lstStyle/>
+          <a:p>
+            <a:pPr algn="ctr"/>
+            <a:endParaRPr lang="en-US"/>
+          </a:p>
+        </p:txBody>
+      </p:sp>
+      <p:sp>
+        <p:nvSpPr>
+          <p:cNvPr id="49" name="TextBox 48"/>
+          <p:cNvSpPr txBox="1"/>
+          <p:nvPr/>
+        </p:nvSpPr>
+        <p:spPr>
+          <a:xfrm>
+            <a:off x="2971800" y="306478"/>
+            <a:ext cx="340150" cy="369332"/>
+          </a:xfrm>
+          <a:prstGeom prst="rect">
+            <a:avLst/>
+          </a:prstGeom>
+          <a:noFill/>
+        </p:spPr>
+        <p:txBody>
+          <a:bodyPr wrap="square" rtlCol="0">
+            <a:spAutoFit/>
+          </a:bodyPr>
+          <a:lstStyle/>
+          <a:p>
+            <a:r>
+              <a:rPr lang="en-US" dirty="0">
+                <a:solidFill>
+                  <a:schemeClr val="accent3">
+                    <a:lumMod val="75000"/>
+                  </a:schemeClr>
+                </a:solidFill>
+              </a:rPr>
+              <a:t>S</a:t>
+            </a:r>
+          </a:p>
+        </p:txBody>
+      </p:sp>
+      <p:sp>
+        <p:nvSpPr>
+          <p:cNvPr id="50" name="Arc 49"/>
+          <p:cNvSpPr/>
+          <p:nvPr/>
+        </p:nvSpPr>
+        <p:spPr>
+          <a:xfrm>
+            <a:off x="1012319" y="3123027"/>
+            <a:ext cx="1295400" cy="1556270"/>
+          </a:xfrm>
+          <a:prstGeom prst="arc">
+            <a:avLst/>
+          </a:prstGeom>
+        </p:spPr>
+        <p:style>
+          <a:lnRef idx="1">
+            <a:schemeClr val="accent1"/>
+          </a:lnRef>
+          <a:fillRef idx="0">
+            <a:schemeClr val="accent1"/>
+          </a:fillRef>
+          <a:effectRef idx="0">
+            <a:schemeClr val="accent1"/>
+          </a:effectRef>
+          <a:fontRef idx="minor">
+            <a:schemeClr val="tx1"/>
+          </a:fontRef>
+        </p:style>
+        <p:txBody>
+          <a:bodyPr rtlCol="0" anchor="ctr"/>
+          <a:lstStyle/>
+          <a:p>
+            <a:pPr algn="ctr"/>
+            <a:endParaRPr lang="en-US"/>
+          </a:p>
+        </p:txBody>
+      </p:sp>
+      <p:sp>
+        <p:nvSpPr>
+          <p:cNvPr id="51" name="Arc 50"/>
+          <p:cNvSpPr/>
+          <p:nvPr/>
+        </p:nvSpPr>
+        <p:spPr>
+          <a:xfrm>
+            <a:off x="2398725" y="3519577"/>
+            <a:ext cx="573076" cy="888356"/>
+          </a:xfrm>
+          <a:prstGeom prst="arc">
+            <a:avLst>
+              <a:gd name="adj1" fmla="val 16200000"/>
+              <a:gd name="adj2" fmla="val 20877808"/>
+            </a:avLst>
+          </a:prstGeom>
+        </p:spPr>
+        <p:style>
+          <a:lnRef idx="1">
+            <a:schemeClr val="accent1"/>
+          </a:lnRef>
+          <a:fillRef idx="0">
+            <a:schemeClr val="accent1"/>
+          </a:fillRef>
+          <a:effectRef idx="0">
+            <a:schemeClr val="accent1"/>
+          </a:effectRef>
+          <a:fontRef idx="minor">
+            <a:schemeClr val="tx1"/>
+          </a:fontRef>
+        </p:style>
+        <p:txBody>
+          <a:bodyPr rtlCol="0" anchor="ctr"/>
+          <a:lstStyle/>
+          <a:p>
+            <a:pPr algn="ctr"/>
+            <a:endParaRPr lang="en-US"/>
+          </a:p>
+        </p:txBody>
+      </p:sp>
+      <mc:AlternateContent xmlns:mc="http://schemas.openxmlformats.org/markup-compatibility/2006">
+        <mc:Choice xmlns:a14="http://schemas.microsoft.com/office/drawing/2010/main" Requires="a14">
+          <p:sp>
+            <p:nvSpPr>
+              <p:cNvPr id="52" name="TextBox 51"/>
+              <p:cNvSpPr txBox="1"/>
+              <p:nvPr/>
+            </p:nvSpPr>
+            <p:spPr>
+              <a:xfrm>
+                <a:off x="1371600" y="3276599"/>
+                <a:ext cx="671974" cy="584775"/>
+              </a:xfrm>
+              <a:prstGeom prst="rect">
+                <a:avLst/>
+              </a:prstGeom>
+              <a:noFill/>
+            </p:spPr>
+            <p:txBody>
+              <a:bodyPr wrap="square" rtlCol="0">
+                <a:spAutoFit/>
+              </a:bodyPr>
+              <a:lstStyle/>
+              <a:p>
+                <a14:m>
+                  <m:oMathPara xmlns:m="http://schemas.openxmlformats.org/officeDocument/2006/math">
+                    <m:oMathParaPr>
+                      <m:jc m:val="centerGroup"/>
+                    </m:oMathParaPr>
+                    <m:oMath xmlns:m="http://schemas.openxmlformats.org/officeDocument/2006/math">
+                      <m:sSub>
+                        <m:sSubPr>
+                          <m:ctrlPr>
+                            <a:rPr lang="en-US" sz="3200" i="1" smtClean="0">
+                              <a:latin typeface="Cambria Math" panose="02040503050406030204" pitchFamily="18" charset="0"/>
+                              <a:ea typeface="Cambria Math" panose="02040503050406030204" pitchFamily="18" charset="0"/>
+                            </a:rPr>
+                          </m:ctrlPr>
+                        </m:sSubPr>
+                        <m:e>
+                          <m:r>
+                            <a:rPr lang="en-US" sz="3200" i="1">
+                              <a:latin typeface="Cambria Math" panose="02040503050406030204" pitchFamily="18" charset="0"/>
+                              <a:ea typeface="Cambria Math" panose="02040503050406030204" pitchFamily="18" charset="0"/>
+                            </a:rPr>
+                            <m:t>𝜃</m:t>
+                          </m:r>
+                        </m:e>
+                        <m:sub>
+                          <m:r>
+                            <a:rPr lang="en-US" sz="3200" b="0" i="1" smtClean="0">
+                              <a:latin typeface="Cambria Math" panose="02040503050406030204" pitchFamily="18" charset="0"/>
+                              <a:ea typeface="Cambria Math" panose="02040503050406030204" pitchFamily="18" charset="0"/>
+                            </a:rPr>
+                            <m:t>1</m:t>
+                          </m:r>
+                        </m:sub>
+                      </m:sSub>
+                    </m:oMath>
+                  </m:oMathPara>
+                </a14:m>
+                <a:endParaRPr lang="en-US" sz="3200" dirty="0"/>
+              </a:p>
+            </p:txBody>
+          </p:sp>
+        </mc:Choice>
+        <mc:Fallback>
+          <p:sp>
+            <p:nvSpPr>
+              <p:cNvPr id="52" name="TextBox 51"/>
+              <p:cNvSpPr txBox="1">
+                <a:spLocks noRot="1" noChangeAspect="1" noMove="1" noResize="1" noEditPoints="1" noAdjustHandles="1" noChangeArrowheads="1" noChangeShapeType="1" noTextEdit="1"/>
+              </p:cNvSpPr>
+              <p:nvPr/>
+            </p:nvSpPr>
+            <p:spPr>
+              <a:xfrm>
+                <a:off x="1371600" y="3276599"/>
+                <a:ext cx="671974" cy="584775"/>
+              </a:xfrm>
+              <a:prstGeom prst="rect">
+                <a:avLst/>
+              </a:prstGeom>
+              <a:blipFill rotWithShape="0">
+                <a:blip r:embed="rId3"/>
+                <a:stretch>
+                  <a:fillRect/>
+                </a:stretch>
+              </a:blipFill>
+            </p:spPr>
+            <p:txBody>
+              <a:bodyPr/>
+              <a:lstStyle/>
+              <a:p>
+                <a:r>
+                  <a:rPr lang="en-US">
+                    <a:noFill/>
+                  </a:rPr>
+                  <a:t> </a:t>
+                </a:r>
+              </a:p>
+            </p:txBody>
+          </p:sp>
+        </mc:Fallback>
+      </mc:AlternateContent>
+      <mc:AlternateContent xmlns:mc="http://schemas.openxmlformats.org/markup-compatibility/2006">
+        <mc:Choice xmlns:a14="http://schemas.microsoft.com/office/drawing/2010/main" Requires="a14">
+          <p:sp>
+            <p:nvSpPr>
+              <p:cNvPr id="53" name="TextBox 52"/>
+              <p:cNvSpPr txBox="1"/>
+              <p:nvPr/>
+            </p:nvSpPr>
+            <p:spPr>
+              <a:xfrm>
+                <a:off x="2339208" y="3498699"/>
+                <a:ext cx="685800" cy="461665"/>
+              </a:xfrm>
+              <a:prstGeom prst="rect">
+                <a:avLst/>
+              </a:prstGeom>
+              <a:noFill/>
+            </p:spPr>
+            <p:txBody>
+              <a:bodyPr wrap="square" rtlCol="0">
+                <a:spAutoFit/>
+              </a:bodyPr>
+              <a:lstStyle/>
+              <a:p>
+                <a14:m>
+                  <m:oMathPara xmlns:m="http://schemas.openxmlformats.org/officeDocument/2006/math">
+                    <m:oMathParaPr>
+                      <m:jc m:val="centerGroup"/>
+                    </m:oMathParaPr>
+                    <m:oMath xmlns:m="http://schemas.openxmlformats.org/officeDocument/2006/math">
+                      <m:sSub>
+                        <m:sSubPr>
+                          <m:ctrlPr>
+                            <a:rPr lang="en-US" sz="2400" i="1" smtClean="0">
+                              <a:latin typeface="Cambria Math" panose="02040503050406030204" pitchFamily="18" charset="0"/>
+                              <a:ea typeface="Cambria Math" panose="02040503050406030204" pitchFamily="18" charset="0"/>
+                            </a:rPr>
+                          </m:ctrlPr>
+                        </m:sSubPr>
+                        <m:e>
+                          <m:r>
+                            <a:rPr lang="en-US" sz="2400" i="1">
+                              <a:latin typeface="Cambria Math" panose="02040503050406030204" pitchFamily="18" charset="0"/>
+                              <a:ea typeface="Cambria Math" panose="02040503050406030204" pitchFamily="18" charset="0"/>
+                            </a:rPr>
+                            <m:t>𝜃</m:t>
+                          </m:r>
+                        </m:e>
+                        <m:sub>
+                          <m:r>
+                            <a:rPr lang="en-US" sz="2400" b="0" i="1" smtClean="0">
+                              <a:latin typeface="Cambria Math" panose="02040503050406030204" pitchFamily="18" charset="0"/>
+                              <a:ea typeface="Cambria Math" panose="02040503050406030204" pitchFamily="18" charset="0"/>
+                            </a:rPr>
+                            <m:t>2</m:t>
+                          </m:r>
+                        </m:sub>
+                      </m:sSub>
+                    </m:oMath>
+                  </m:oMathPara>
+                </a14:m>
+                <a:endParaRPr lang="en-US" sz="2400" dirty="0"/>
+              </a:p>
+            </p:txBody>
+          </p:sp>
+        </mc:Choice>
+        <mc:Fallback>
+          <p:sp>
+            <p:nvSpPr>
+              <p:cNvPr id="53" name="TextBox 52"/>
+              <p:cNvSpPr txBox="1">
+                <a:spLocks noRot="1" noChangeAspect="1" noMove="1" noResize="1" noEditPoints="1" noAdjustHandles="1" noChangeArrowheads="1" noChangeShapeType="1" noTextEdit="1"/>
+              </p:cNvSpPr>
+              <p:nvPr/>
+            </p:nvSpPr>
+            <p:spPr>
+              <a:xfrm>
+                <a:off x="2339208" y="3498699"/>
+                <a:ext cx="685800" cy="461665"/>
+              </a:xfrm>
+              <a:prstGeom prst="rect">
+                <a:avLst/>
+              </a:prstGeom>
+              <a:blipFill rotWithShape="0">
+                <a:blip r:embed="rId4"/>
+                <a:stretch>
+                  <a:fillRect/>
+                </a:stretch>
+              </a:blipFill>
+            </p:spPr>
+            <p:txBody>
+              <a:bodyPr/>
+              <a:lstStyle/>
+              <a:p>
+                <a:r>
+                  <a:rPr lang="en-US">
+                    <a:noFill/>
+                  </a:rPr>
+                  <a:t> </a:t>
+                </a:r>
+              </a:p>
+            </p:txBody>
+          </p:sp>
+        </mc:Fallback>
+      </mc:AlternateContent>
+      <mc:AlternateContent xmlns:mc="http://schemas.openxmlformats.org/markup-compatibility/2006">
+        <mc:Choice xmlns:a14="http://schemas.microsoft.com/office/drawing/2010/main" Requires="a14">
+          <p:sp>
+            <p:nvSpPr>
+              <p:cNvPr id="57" name="TextBox 56"/>
+              <p:cNvSpPr txBox="1"/>
+              <p:nvPr/>
+            </p:nvSpPr>
+            <p:spPr>
+              <a:xfrm rot="19167038">
+                <a:off x="3823741" y="528805"/>
+                <a:ext cx="419328" cy="369332"/>
+              </a:xfrm>
+              <a:prstGeom prst="rect">
+                <a:avLst/>
+              </a:prstGeom>
+              <a:noFill/>
+            </p:spPr>
+            <p:txBody>
+              <a:bodyPr wrap="square" rtlCol="0">
+                <a:spAutoFit/>
+              </a:bodyPr>
+              <a:lstStyle/>
+              <a:p>
+                <a14:m>
+                  <m:oMathPara xmlns:m="http://schemas.openxmlformats.org/officeDocument/2006/math">
+                    <m:oMathParaPr>
+                      <m:jc m:val="centerGroup"/>
+                    </m:oMathParaPr>
+                    <m:oMath xmlns:m="http://schemas.openxmlformats.org/officeDocument/2006/math">
+                      <m:r>
+                        <a:rPr lang="en-US" i="1" dirty="0" smtClean="0">
+                          <a:latin typeface="Cambria Math" panose="02040503050406030204" pitchFamily="18" charset="0"/>
+                          <a:ea typeface="Cambria Math" panose="02040503050406030204" pitchFamily="18" charset="0"/>
+                        </a:rPr>
+                        <m:t>𝛼</m:t>
+                      </m:r>
+                    </m:oMath>
+                  </m:oMathPara>
+                </a14:m>
+                <a:endParaRPr lang="en-US" dirty="0"/>
+              </a:p>
+            </p:txBody>
+          </p:sp>
+        </mc:Choice>
+        <mc:Fallback>
+          <p:sp>
+            <p:nvSpPr>
+              <p:cNvPr id="57" name="TextBox 56"/>
+              <p:cNvSpPr txBox="1">
+                <a:spLocks noRot="1" noChangeAspect="1" noMove="1" noResize="1" noEditPoints="1" noAdjustHandles="1" noChangeArrowheads="1" noChangeShapeType="1" noTextEdit="1"/>
+              </p:cNvSpPr>
+              <p:nvPr/>
+            </p:nvSpPr>
+            <p:spPr>
+              <a:xfrm rot="19167038">
+                <a:off x="3823741" y="528805"/>
+                <a:ext cx="419328" cy="369332"/>
+              </a:xfrm>
+              <a:prstGeom prst="rect">
+                <a:avLst/>
+              </a:prstGeom>
+              <a:blipFill rotWithShape="0">
+                <a:blip r:embed="rId5"/>
+                <a:stretch>
+                  <a:fillRect/>
+                </a:stretch>
+              </a:blipFill>
+            </p:spPr>
+            <p:txBody>
+              <a:bodyPr/>
+              <a:lstStyle/>
+              <a:p>
+                <a:r>
+                  <a:rPr lang="en-US">
+                    <a:noFill/>
+                  </a:rPr>
+                  <a:t> </a:t>
+                </a:r>
+              </a:p>
+            </p:txBody>
+          </p:sp>
+        </mc:Fallback>
+      </mc:AlternateContent>
+      <p:sp>
+        <p:nvSpPr>
+          <p:cNvPr id="58" name="Oval 57"/>
+          <p:cNvSpPr/>
+          <p:nvPr/>
+        </p:nvSpPr>
+        <p:spPr>
+          <a:xfrm>
+            <a:off x="3735697" y="1104446"/>
+            <a:ext cx="226703" cy="190954"/>
+          </a:xfrm>
+          <a:prstGeom prst="ellipse">
+            <a:avLst/>
+          </a:prstGeom>
+        </p:spPr>
+        <p:style>
+          <a:lnRef idx="2">
+            <a:schemeClr val="accent1">
+              <a:shade val="50000"/>
+            </a:schemeClr>
+          </a:lnRef>
+          <a:fillRef idx="1">
+            <a:schemeClr val="accent1"/>
+          </a:fillRef>
+          <a:effectRef idx="0">
+            <a:schemeClr val="accent1"/>
+          </a:effectRef>
+          <a:fontRef idx="minor">
+            <a:schemeClr val="lt1"/>
+          </a:fontRef>
+        </p:style>
+        <p:txBody>
+          <a:bodyPr rtlCol="0" anchor="ctr"/>
+          <a:lstStyle/>
+          <a:p>
+            <a:pPr algn="ctr"/>
+            <a:endParaRPr lang="en-US"/>
+          </a:p>
+        </p:txBody>
+      </p:sp>
+      <p:sp>
+        <p:nvSpPr>
+          <p:cNvPr id="59" name="Oval 58"/>
+          <p:cNvSpPr/>
+          <p:nvPr/>
+        </p:nvSpPr>
+        <p:spPr>
+          <a:xfrm>
+            <a:off x="4658412" y="1296650"/>
+            <a:ext cx="226703" cy="190954"/>
+          </a:xfrm>
+          <a:prstGeom prst="ellipse">
+            <a:avLst/>
+          </a:prstGeom>
+        </p:spPr>
+        <p:style>
+          <a:lnRef idx="2">
+            <a:schemeClr val="accent1">
+              <a:shade val="50000"/>
+            </a:schemeClr>
+          </a:lnRef>
+          <a:fillRef idx="1">
+            <a:schemeClr val="accent1"/>
+          </a:fillRef>
+          <a:effectRef idx="0">
+            <a:schemeClr val="accent1"/>
+          </a:effectRef>
+          <a:fontRef idx="minor">
+            <a:schemeClr val="lt1"/>
+          </a:fontRef>
+        </p:style>
+        <p:txBody>
+          <a:bodyPr rtlCol="0" anchor="ctr"/>
+          <a:lstStyle/>
+          <a:p>
+            <a:pPr algn="ctr"/>
+            <a:endParaRPr lang="en-US"/>
+          </a:p>
+        </p:txBody>
+      </p:sp>
+      <mc:AlternateContent xmlns:mc="http://schemas.openxmlformats.org/markup-compatibility/2006">
+        <mc:Choice xmlns:a14="http://schemas.microsoft.com/office/drawing/2010/main" Requires="a14">
+          <p:sp>
+            <p:nvSpPr>
+              <p:cNvPr id="60" name="TextBox 59"/>
+              <p:cNvSpPr txBox="1"/>
+              <p:nvPr/>
+            </p:nvSpPr>
+            <p:spPr>
+              <a:xfrm rot="19684607">
+                <a:off x="4665295" y="828628"/>
+                <a:ext cx="381000" cy="369332"/>
+              </a:xfrm>
+              <a:prstGeom prst="rect">
+                <a:avLst/>
+              </a:prstGeom>
+              <a:noFill/>
+            </p:spPr>
+            <p:txBody>
+              <a:bodyPr wrap="square" rtlCol="0">
+                <a:spAutoFit/>
+              </a:bodyPr>
+              <a:lstStyle/>
+              <a:p>
+                <a14:m>
+                  <m:oMathPara xmlns:m="http://schemas.openxmlformats.org/officeDocument/2006/math">
+                    <m:oMathParaPr>
+                      <m:jc m:val="centerGroup"/>
+                    </m:oMathParaPr>
+                    <m:oMath xmlns:m="http://schemas.openxmlformats.org/officeDocument/2006/math">
+                      <m:r>
+                        <a:rPr lang="en-US" i="1" dirty="0">
+                          <a:latin typeface="Cambria Math" panose="02040503050406030204" pitchFamily="18" charset="0"/>
+                          <a:ea typeface="Cambria Math" panose="02040503050406030204" pitchFamily="18" charset="0"/>
+                        </a:rPr>
+                        <m:t>𝛼</m:t>
+                      </m:r>
+                    </m:oMath>
+                  </m:oMathPara>
+                </a14:m>
+                <a:endParaRPr lang="en-US" dirty="0"/>
+              </a:p>
+            </p:txBody>
+          </p:sp>
+        </mc:Choice>
+        <mc:Fallback>
+          <p:sp>
+            <p:nvSpPr>
+              <p:cNvPr id="60" name="TextBox 59"/>
+              <p:cNvSpPr txBox="1">
+                <a:spLocks noRot="1" noChangeAspect="1" noMove="1" noResize="1" noEditPoints="1" noAdjustHandles="1" noChangeArrowheads="1" noChangeShapeType="1" noTextEdit="1"/>
+              </p:cNvSpPr>
+              <p:nvPr/>
+            </p:nvSpPr>
+            <p:spPr>
+              <a:xfrm rot="19684607">
+                <a:off x="4665295" y="828628"/>
+                <a:ext cx="381000" cy="369332"/>
+              </a:xfrm>
+              <a:prstGeom prst="rect">
+                <a:avLst/>
+              </a:prstGeom>
+              <a:blipFill rotWithShape="0">
+                <a:blip r:embed="rId6"/>
+                <a:stretch>
+                  <a:fillRect/>
+                </a:stretch>
+              </a:blipFill>
+            </p:spPr>
+            <p:txBody>
+              <a:bodyPr/>
+              <a:lstStyle/>
+              <a:p>
+                <a:r>
+                  <a:rPr lang="en-US">
+                    <a:noFill/>
+                  </a:rPr>
+                  <a:t> </a:t>
+                </a:r>
+              </a:p>
+            </p:txBody>
+          </p:sp>
+        </mc:Fallback>
+      </mc:AlternateContent>
+      <p:sp>
+        <p:nvSpPr>
+          <p:cNvPr id="61" name="Oval 60"/>
+          <p:cNvSpPr/>
+          <p:nvPr/>
+        </p:nvSpPr>
+        <p:spPr>
+          <a:xfrm>
+            <a:off x="5410200" y="1790246"/>
+            <a:ext cx="226703" cy="190954"/>
+          </a:xfrm>
+          <a:prstGeom prst="ellipse">
+            <a:avLst/>
+          </a:prstGeom>
+        </p:spPr>
+        <p:style>
+          <a:lnRef idx="2">
+            <a:schemeClr val="accent1">
+              <a:shade val="50000"/>
+            </a:schemeClr>
+          </a:lnRef>
+          <a:fillRef idx="1">
+            <a:schemeClr val="accent1"/>
+          </a:fillRef>
+          <a:effectRef idx="0">
+            <a:schemeClr val="accent1"/>
+          </a:effectRef>
+          <a:fontRef idx="minor">
+            <a:schemeClr val="lt1"/>
+          </a:fontRef>
+        </p:style>
+        <p:txBody>
+          <a:bodyPr rtlCol="0" anchor="ctr"/>
+          <a:lstStyle/>
+          <a:p>
+            <a:pPr algn="ctr"/>
+            <a:endParaRPr lang="en-US"/>
+          </a:p>
+        </p:txBody>
+      </p:sp>
+      <mc:AlternateContent xmlns:mc="http://schemas.openxmlformats.org/markup-compatibility/2006">
+        <mc:Choice xmlns:a14="http://schemas.microsoft.com/office/drawing/2010/main" Requires="a14">
+          <p:sp>
+            <p:nvSpPr>
+              <p:cNvPr id="65" name="TextBox 64"/>
+              <p:cNvSpPr txBox="1"/>
+              <p:nvPr/>
+            </p:nvSpPr>
+            <p:spPr>
+              <a:xfrm rot="20120546">
+                <a:off x="5522986" y="1476456"/>
+                <a:ext cx="381000" cy="369332"/>
+              </a:xfrm>
+              <a:prstGeom prst="rect">
+                <a:avLst/>
+              </a:prstGeom>
+              <a:noFill/>
+            </p:spPr>
+            <p:txBody>
+              <a:bodyPr wrap="square" rtlCol="0">
+                <a:spAutoFit/>
+              </a:bodyPr>
+              <a:lstStyle/>
+              <a:p>
+                <a14:m>
+                  <m:oMathPara xmlns:m="http://schemas.openxmlformats.org/officeDocument/2006/math">
+                    <m:oMathParaPr>
+                      <m:jc m:val="centerGroup"/>
+                    </m:oMathParaPr>
+                    <m:oMath xmlns:m="http://schemas.openxmlformats.org/officeDocument/2006/math">
+                      <m:r>
+                        <a:rPr lang="en-US" i="1" dirty="0">
+                          <a:latin typeface="Cambria Math" panose="02040503050406030204" pitchFamily="18" charset="0"/>
+                          <a:ea typeface="Cambria Math" panose="02040503050406030204" pitchFamily="18" charset="0"/>
+                        </a:rPr>
+                        <m:t>𝛼</m:t>
+                      </m:r>
+                    </m:oMath>
+                  </m:oMathPara>
+                </a14:m>
+                <a:endParaRPr lang="en-US" dirty="0"/>
+              </a:p>
+            </p:txBody>
+          </p:sp>
+        </mc:Choice>
+        <mc:Fallback>
+          <p:sp>
+            <p:nvSpPr>
+              <p:cNvPr id="65" name="TextBox 64"/>
+              <p:cNvSpPr txBox="1">
+                <a:spLocks noRot="1" noChangeAspect="1" noMove="1" noResize="1" noEditPoints="1" noAdjustHandles="1" noChangeArrowheads="1" noChangeShapeType="1" noTextEdit="1"/>
+              </p:cNvSpPr>
+              <p:nvPr/>
+            </p:nvSpPr>
+            <p:spPr>
+              <a:xfrm rot="20120546">
+                <a:off x="5522986" y="1476456"/>
+                <a:ext cx="381000" cy="369332"/>
+              </a:xfrm>
+              <a:prstGeom prst="rect">
+                <a:avLst/>
+              </a:prstGeom>
+              <a:blipFill rotWithShape="0">
+                <a:blip r:embed="rId7"/>
+                <a:stretch>
+                  <a:fillRect/>
+                </a:stretch>
+              </a:blipFill>
+            </p:spPr>
+            <p:txBody>
+              <a:bodyPr/>
+              <a:lstStyle/>
+              <a:p>
+                <a:r>
+                  <a:rPr lang="en-US">
+                    <a:noFill/>
+                  </a:rPr>
+                  <a:t> </a:t>
+                </a:r>
+              </a:p>
+            </p:txBody>
+          </p:sp>
+        </mc:Fallback>
+      </mc:AlternateContent>
+      <p:sp>
+        <p:nvSpPr>
+          <p:cNvPr id="66" name="Oval 65"/>
+          <p:cNvSpPr/>
+          <p:nvPr/>
+        </p:nvSpPr>
+        <p:spPr>
+          <a:xfrm>
+            <a:off x="6447419" y="2546704"/>
+            <a:ext cx="226703" cy="190954"/>
+          </a:xfrm>
+          <a:prstGeom prst="ellipse">
+            <a:avLst/>
+          </a:prstGeom>
+        </p:spPr>
+        <p:style>
+          <a:lnRef idx="2">
+            <a:schemeClr val="accent1">
+              <a:shade val="50000"/>
+            </a:schemeClr>
+          </a:lnRef>
+          <a:fillRef idx="1">
+            <a:schemeClr val="accent1"/>
+          </a:fillRef>
+          <a:effectRef idx="0">
+            <a:schemeClr val="accent1"/>
+          </a:effectRef>
+          <a:fontRef idx="minor">
+            <a:schemeClr val="lt1"/>
+          </a:fontRef>
+        </p:style>
+        <p:txBody>
+          <a:bodyPr rtlCol="0" anchor="ctr"/>
+          <a:lstStyle/>
+          <a:p>
+            <a:pPr algn="ctr"/>
+            <a:endParaRPr lang="en-US"/>
+          </a:p>
+        </p:txBody>
+      </p:sp>
+      <p:cxnSp>
+        <p:nvCxnSpPr>
+          <p:cNvPr id="68" name="Straight Arrow Connector 67"/>
+          <p:cNvCxnSpPr/>
+          <p:nvPr/>
+        </p:nvCxnSpPr>
+        <p:spPr>
+          <a:xfrm flipV="1">
+            <a:off x="3933555" y="649498"/>
+            <a:ext cx="347276" cy="355865"/>
+          </a:xfrm>
+          <a:prstGeom prst="straightConnector1">
+            <a:avLst/>
+          </a:prstGeom>
+          <a:ln w="22225">
+            <a:tailEnd type="triangle"/>
+          </a:ln>
+        </p:spPr>
+        <p:style>
+          <a:lnRef idx="1">
+            <a:schemeClr val="accent1"/>
+          </a:lnRef>
+          <a:fillRef idx="0">
+            <a:schemeClr val="accent1"/>
+          </a:fillRef>
+          <a:effectRef idx="0">
+            <a:schemeClr val="accent1"/>
+          </a:effectRef>
+          <a:fontRef idx="minor">
+            <a:schemeClr val="tx1"/>
+          </a:fontRef>
+        </p:style>
+      </p:cxnSp>
+      <p:cxnSp>
+        <p:nvCxnSpPr>
+          <p:cNvPr id="71" name="Straight Arrow Connector 70"/>
+          <p:cNvCxnSpPr/>
+          <p:nvPr/>
+        </p:nvCxnSpPr>
+        <p:spPr>
+          <a:xfrm flipV="1">
+            <a:off x="4777932" y="1057871"/>
+            <a:ext cx="358558" cy="274941"/>
+          </a:xfrm>
+          <a:prstGeom prst="straightConnector1">
+            <a:avLst/>
+          </a:prstGeom>
+          <a:ln w="22225">
+            <a:tailEnd type="triangle"/>
+          </a:ln>
+        </p:spPr>
+        <p:style>
+          <a:lnRef idx="1">
+            <a:schemeClr val="accent1"/>
+          </a:lnRef>
+          <a:fillRef idx="0">
+            <a:schemeClr val="accent1"/>
+          </a:fillRef>
+          <a:effectRef idx="0">
+            <a:schemeClr val="accent1"/>
+          </a:effectRef>
+          <a:fontRef idx="minor">
+            <a:schemeClr val="tx1"/>
+          </a:fontRef>
+        </p:style>
+      </p:cxnSp>
+      <p:cxnSp>
+        <p:nvCxnSpPr>
+          <p:cNvPr id="72" name="Straight Arrow Connector 71"/>
+          <p:cNvCxnSpPr/>
+          <p:nvPr/>
+        </p:nvCxnSpPr>
+        <p:spPr>
+          <a:xfrm flipV="1">
+            <a:off x="5625544" y="1794826"/>
+            <a:ext cx="351577" cy="168686"/>
+          </a:xfrm>
+          <a:prstGeom prst="straightConnector1">
+            <a:avLst/>
+          </a:prstGeom>
+          <a:ln w="22225">
+            <a:tailEnd type="triangle"/>
+          </a:ln>
+        </p:spPr>
+        <p:style>
+          <a:lnRef idx="1">
+            <a:schemeClr val="accent1"/>
+          </a:lnRef>
+          <a:fillRef idx="0">
+            <a:schemeClr val="accent1"/>
+          </a:fillRef>
+          <a:effectRef idx="0">
+            <a:schemeClr val="accent1"/>
+          </a:effectRef>
+          <a:fontRef idx="minor">
+            <a:schemeClr val="tx1"/>
+          </a:fontRef>
+        </p:style>
+      </p:cxnSp>
+      <mc:AlternateContent xmlns:mc="http://schemas.openxmlformats.org/markup-compatibility/2006">
+        <mc:Choice xmlns:a14="http://schemas.microsoft.com/office/drawing/2010/main" Requires="a14">
+          <p:sp>
+            <p:nvSpPr>
+              <p:cNvPr id="76" name="TextBox 75"/>
+              <p:cNvSpPr txBox="1"/>
+              <p:nvPr/>
+            </p:nvSpPr>
+            <p:spPr>
+              <a:xfrm>
+                <a:off x="1674708" y="2671002"/>
+                <a:ext cx="695268" cy="369332"/>
+              </a:xfrm>
+              <a:prstGeom prst="rect">
+                <a:avLst/>
+              </a:prstGeom>
+              <a:noFill/>
+            </p:spPr>
+            <p:txBody>
+              <a:bodyPr wrap="square" rtlCol="0">
+                <a:spAutoFit/>
+              </a:bodyPr>
+              <a:lstStyle/>
+              <a:p>
+                <a14:m>
+                  <m:oMathPara xmlns:m="http://schemas.openxmlformats.org/officeDocument/2006/math">
+                    <m:oMathParaPr>
+                      <m:jc m:val="centerGroup"/>
+                    </m:oMathParaPr>
+                    <m:oMath xmlns:m="http://schemas.openxmlformats.org/officeDocument/2006/math">
+                      <m:r>
+                        <a:rPr lang="en-US" b="0" i="1" smtClean="0">
+                          <a:latin typeface="Cambria Math" panose="02040503050406030204" pitchFamily="18" charset="0"/>
+                        </a:rPr>
+                        <m:t>𝑑</m:t>
+                      </m:r>
+                      <m:r>
+                        <a:rPr lang="en-US" b="0" i="1" smtClean="0">
+                          <a:latin typeface="Cambria Math" panose="02040503050406030204" pitchFamily="18" charset="0"/>
+                          <a:ea typeface="Cambria Math" panose="02040503050406030204" pitchFamily="18" charset="0"/>
+                        </a:rPr>
+                        <m:t>𝜃</m:t>
+                      </m:r>
+                    </m:oMath>
+                  </m:oMathPara>
+                </a14:m>
+                <a:endParaRPr lang="en-US" dirty="0"/>
+              </a:p>
+            </p:txBody>
+          </p:sp>
+        </mc:Choice>
+        <mc:Fallback>
+          <p:sp>
+            <p:nvSpPr>
+              <p:cNvPr id="76" name="TextBox 75"/>
+              <p:cNvSpPr txBox="1">
+                <a:spLocks noRot="1" noChangeAspect="1" noMove="1" noResize="1" noEditPoints="1" noAdjustHandles="1" noChangeArrowheads="1" noChangeShapeType="1" noTextEdit="1"/>
+              </p:cNvSpPr>
+              <p:nvPr/>
+            </p:nvSpPr>
+            <p:spPr>
+              <a:xfrm>
+                <a:off x="1674708" y="2671002"/>
+                <a:ext cx="695268" cy="369332"/>
+              </a:xfrm>
+              <a:prstGeom prst="rect">
+                <a:avLst/>
+              </a:prstGeom>
+              <a:blipFill rotWithShape="0">
+                <a:blip r:embed="rId8"/>
+                <a:stretch>
+                  <a:fillRect/>
+                </a:stretch>
+              </a:blipFill>
+            </p:spPr>
+            <p:txBody>
+              <a:bodyPr/>
+              <a:lstStyle/>
+              <a:p>
+                <a:r>
+                  <a:rPr lang="en-US">
+                    <a:noFill/>
+                  </a:rPr>
+                  <a:t> </a:t>
+                </a:r>
+              </a:p>
+            </p:txBody>
+          </p:sp>
+        </mc:Fallback>
+      </mc:AlternateContent>
+      <mc:AlternateContent xmlns:mc="http://schemas.openxmlformats.org/markup-compatibility/2006">
+        <mc:Choice xmlns:a14="http://schemas.microsoft.com/office/drawing/2010/main" Requires="a14">
+          <p:sp>
+            <p:nvSpPr>
+              <p:cNvPr id="77" name="TextBox 76"/>
+              <p:cNvSpPr txBox="1"/>
+              <p:nvPr/>
+            </p:nvSpPr>
+            <p:spPr>
+              <a:xfrm>
+                <a:off x="1904139" y="2814629"/>
+                <a:ext cx="695268" cy="369332"/>
+              </a:xfrm>
+              <a:prstGeom prst="rect">
+                <a:avLst/>
+              </a:prstGeom>
+              <a:noFill/>
+            </p:spPr>
+            <p:txBody>
+              <a:bodyPr wrap="square" rtlCol="0">
+                <a:spAutoFit/>
+              </a:bodyPr>
+              <a:lstStyle/>
+              <a:p>
+                <a14:m>
+                  <m:oMathPara xmlns:m="http://schemas.openxmlformats.org/officeDocument/2006/math">
+                    <m:oMathParaPr>
+                      <m:jc m:val="centerGroup"/>
+                    </m:oMathParaPr>
+                    <m:oMath xmlns:m="http://schemas.openxmlformats.org/officeDocument/2006/math">
+                      <m:r>
+                        <a:rPr lang="en-US" b="0" i="1" smtClean="0">
+                          <a:latin typeface="Cambria Math" panose="02040503050406030204" pitchFamily="18" charset="0"/>
+                        </a:rPr>
+                        <m:t>𝑑</m:t>
+                      </m:r>
+                      <m:r>
+                        <a:rPr lang="en-US" b="0" i="1" smtClean="0">
+                          <a:latin typeface="Cambria Math" panose="02040503050406030204" pitchFamily="18" charset="0"/>
+                          <a:ea typeface="Cambria Math" panose="02040503050406030204" pitchFamily="18" charset="0"/>
+                        </a:rPr>
+                        <m:t>𝜃</m:t>
+                      </m:r>
+                    </m:oMath>
+                  </m:oMathPara>
+                </a14:m>
+                <a:endParaRPr lang="en-US" dirty="0"/>
+              </a:p>
+            </p:txBody>
+          </p:sp>
+        </mc:Choice>
+        <mc:Fallback>
+          <p:sp>
+            <p:nvSpPr>
+              <p:cNvPr id="77" name="TextBox 76"/>
+              <p:cNvSpPr txBox="1">
+                <a:spLocks noRot="1" noChangeAspect="1" noMove="1" noResize="1" noEditPoints="1" noAdjustHandles="1" noChangeArrowheads="1" noChangeShapeType="1" noTextEdit="1"/>
+              </p:cNvSpPr>
+              <p:nvPr/>
+            </p:nvSpPr>
+            <p:spPr>
+              <a:xfrm>
+                <a:off x="1904139" y="2814629"/>
+                <a:ext cx="695268" cy="369332"/>
+              </a:xfrm>
+              <a:prstGeom prst="rect">
+                <a:avLst/>
+              </a:prstGeom>
+              <a:blipFill rotWithShape="0">
+                <a:blip r:embed="rId9"/>
+                <a:stretch>
+                  <a:fillRect/>
+                </a:stretch>
+              </a:blipFill>
+            </p:spPr>
+            <p:txBody>
+              <a:bodyPr/>
+              <a:lstStyle/>
+              <a:p>
+                <a:r>
+                  <a:rPr lang="en-US">
+                    <a:noFill/>
+                  </a:rPr>
+                  <a:t> </a:t>
+                </a:r>
+              </a:p>
+            </p:txBody>
+          </p:sp>
+        </mc:Fallback>
+      </mc:AlternateContent>
+      <mc:AlternateContent xmlns:mc="http://schemas.openxmlformats.org/markup-compatibility/2006">
+        <mc:Choice xmlns:a14="http://schemas.microsoft.com/office/drawing/2010/main" Requires="a14">
+          <p:sp>
+            <p:nvSpPr>
+              <p:cNvPr id="78" name="TextBox 77"/>
+              <p:cNvSpPr txBox="1"/>
+              <p:nvPr/>
+            </p:nvSpPr>
+            <p:spPr>
+              <a:xfrm>
+                <a:off x="2155640" y="2976156"/>
+                <a:ext cx="695268" cy="369332"/>
+              </a:xfrm>
+              <a:prstGeom prst="rect">
+                <a:avLst/>
+              </a:prstGeom>
+              <a:noFill/>
+            </p:spPr>
+            <p:txBody>
+              <a:bodyPr wrap="square" rtlCol="0">
+                <a:spAutoFit/>
+              </a:bodyPr>
+              <a:lstStyle/>
+              <a:p>
+                <a14:m>
+                  <m:oMathPara xmlns:m="http://schemas.openxmlformats.org/officeDocument/2006/math">
+                    <m:oMathParaPr>
+                      <m:jc m:val="centerGroup"/>
+                    </m:oMathParaPr>
+                    <m:oMath xmlns:m="http://schemas.openxmlformats.org/officeDocument/2006/math">
+                      <m:r>
+                        <a:rPr lang="en-US" b="0" i="1" smtClean="0">
+                          <a:latin typeface="Cambria Math" panose="02040503050406030204" pitchFamily="18" charset="0"/>
+                        </a:rPr>
+                        <m:t>𝑑</m:t>
+                      </m:r>
+                      <m:r>
+                        <a:rPr lang="en-US" b="0" i="1" smtClean="0">
+                          <a:latin typeface="Cambria Math" panose="02040503050406030204" pitchFamily="18" charset="0"/>
+                          <a:ea typeface="Cambria Math" panose="02040503050406030204" pitchFamily="18" charset="0"/>
+                        </a:rPr>
+                        <m:t>𝜃</m:t>
+                      </m:r>
+                    </m:oMath>
+                  </m:oMathPara>
+                </a14:m>
+                <a:endParaRPr lang="en-US" dirty="0"/>
+              </a:p>
+            </p:txBody>
+          </p:sp>
+        </mc:Choice>
+        <mc:Fallback>
+          <p:sp>
+            <p:nvSpPr>
+              <p:cNvPr id="78" name="TextBox 77"/>
+              <p:cNvSpPr txBox="1">
+                <a:spLocks noRot="1" noChangeAspect="1" noMove="1" noResize="1" noEditPoints="1" noAdjustHandles="1" noChangeArrowheads="1" noChangeShapeType="1" noTextEdit="1"/>
+              </p:cNvSpPr>
+              <p:nvPr/>
+            </p:nvSpPr>
+            <p:spPr>
+              <a:xfrm>
+                <a:off x="2155640" y="2976156"/>
+                <a:ext cx="695268" cy="369332"/>
+              </a:xfrm>
+              <a:prstGeom prst="rect">
+                <a:avLst/>
+              </a:prstGeom>
+              <a:blipFill rotWithShape="0">
+                <a:blip r:embed="rId10"/>
+                <a:stretch>
+                  <a:fillRect/>
+                </a:stretch>
+              </a:blipFill>
+            </p:spPr>
+            <p:txBody>
+              <a:bodyPr/>
+              <a:lstStyle/>
+              <a:p>
+                <a:r>
+                  <a:rPr lang="en-US">
+                    <a:noFill/>
+                  </a:rPr>
+                  <a:t> </a:t>
+                </a:r>
+              </a:p>
+            </p:txBody>
+          </p:sp>
+        </mc:Fallback>
+      </mc:AlternateContent>
+      <mc:AlternateContent xmlns:mc="http://schemas.openxmlformats.org/markup-compatibility/2006">
+        <mc:Choice xmlns:a14="http://schemas.microsoft.com/office/drawing/2010/main" Requires="a14">
+          <p:sp>
+            <p:nvSpPr>
+              <p:cNvPr id="79" name="TextBox 78"/>
+              <p:cNvSpPr txBox="1"/>
+              <p:nvPr/>
+            </p:nvSpPr>
+            <p:spPr>
+              <a:xfrm>
+                <a:off x="2320206" y="3228202"/>
+                <a:ext cx="695268" cy="369332"/>
+              </a:xfrm>
+              <a:prstGeom prst="rect">
+                <a:avLst/>
+              </a:prstGeom>
+              <a:noFill/>
+            </p:spPr>
+            <p:txBody>
+              <a:bodyPr wrap="square" rtlCol="0">
+                <a:spAutoFit/>
+              </a:bodyPr>
+              <a:lstStyle/>
+              <a:p>
+                <a14:m>
+                  <m:oMathPara xmlns:m="http://schemas.openxmlformats.org/officeDocument/2006/math">
+                    <m:oMathParaPr>
+                      <m:jc m:val="centerGroup"/>
+                    </m:oMathParaPr>
+                    <m:oMath xmlns:m="http://schemas.openxmlformats.org/officeDocument/2006/math">
+                      <m:r>
+                        <a:rPr lang="en-US" b="0" i="1" smtClean="0">
+                          <a:latin typeface="Cambria Math" panose="02040503050406030204" pitchFamily="18" charset="0"/>
+                        </a:rPr>
+                        <m:t>𝑑</m:t>
+                      </m:r>
+                      <m:r>
+                        <a:rPr lang="en-US" b="0" i="1" smtClean="0">
+                          <a:latin typeface="Cambria Math" panose="02040503050406030204" pitchFamily="18" charset="0"/>
+                          <a:ea typeface="Cambria Math" panose="02040503050406030204" pitchFamily="18" charset="0"/>
+                        </a:rPr>
+                        <m:t>𝜃</m:t>
+                      </m:r>
+                    </m:oMath>
+                  </m:oMathPara>
+                </a14:m>
+                <a:endParaRPr lang="en-US" dirty="0"/>
+              </a:p>
+            </p:txBody>
+          </p:sp>
+        </mc:Choice>
+        <mc:Fallback>
+          <p:sp>
+            <p:nvSpPr>
+              <p:cNvPr id="79" name="TextBox 78"/>
+              <p:cNvSpPr txBox="1">
+                <a:spLocks noRot="1" noChangeAspect="1" noMove="1" noResize="1" noEditPoints="1" noAdjustHandles="1" noChangeArrowheads="1" noChangeShapeType="1" noTextEdit="1"/>
+              </p:cNvSpPr>
+              <p:nvPr/>
+            </p:nvSpPr>
+            <p:spPr>
+              <a:xfrm>
+                <a:off x="2320206" y="3228202"/>
+                <a:ext cx="695268" cy="369332"/>
+              </a:xfrm>
+              <a:prstGeom prst="rect">
+                <a:avLst/>
+              </a:prstGeom>
+              <a:blipFill rotWithShape="0">
+                <a:blip r:embed="rId11"/>
+                <a:stretch>
+                  <a:fillRect/>
+                </a:stretch>
+              </a:blipFill>
+            </p:spPr>
+            <p:txBody>
+              <a:bodyPr/>
+              <a:lstStyle/>
+              <a:p>
+                <a:r>
+                  <a:rPr lang="en-US">
+                    <a:noFill/>
+                  </a:rPr>
+                  <a:t> </a:t>
+                </a:r>
+              </a:p>
+            </p:txBody>
+          </p:sp>
+        </mc:Fallback>
+      </mc:AlternateContent>
+      <mc:AlternateContent xmlns:mc="http://schemas.openxmlformats.org/markup-compatibility/2006">
+        <mc:Choice xmlns:a14="http://schemas.microsoft.com/office/drawing/2010/main" Requires="a14">
+          <p:sp>
+            <p:nvSpPr>
+              <p:cNvPr id="80" name="TextBox 79"/>
+              <p:cNvSpPr txBox="1"/>
+              <p:nvPr/>
+            </p:nvSpPr>
+            <p:spPr>
+              <a:xfrm>
+                <a:off x="6400800" y="4292025"/>
+                <a:ext cx="533400" cy="584775"/>
+              </a:xfrm>
+              <a:prstGeom prst="rect">
+                <a:avLst/>
+              </a:prstGeom>
+              <a:noFill/>
+            </p:spPr>
+            <p:txBody>
+              <a:bodyPr wrap="square" rtlCol="0">
+                <a:spAutoFit/>
+              </a:bodyPr>
+              <a:lstStyle/>
+              <a:p>
+                <a14:m>
+                  <m:oMathPara xmlns:m="http://schemas.openxmlformats.org/officeDocument/2006/math">
+                    <m:oMathParaPr>
+                      <m:jc m:val="centerGroup"/>
+                    </m:oMathParaPr>
+                    <m:oMath xmlns:m="http://schemas.openxmlformats.org/officeDocument/2006/math">
+                      <m:sSub>
+                        <m:sSubPr>
+                          <m:ctrlPr>
+                            <a:rPr lang="en-US" sz="3200" i="1" dirty="0" smtClean="0">
+                              <a:latin typeface="Cambria Math" panose="02040503050406030204" pitchFamily="18" charset="0"/>
+                            </a:rPr>
+                          </m:ctrlPr>
+                        </m:sSubPr>
+                        <m:e>
+                          <m:r>
+                            <a:rPr lang="en-US" sz="3200" b="0" i="1" dirty="0" smtClean="0">
+                              <a:latin typeface="Cambria Math" panose="02040503050406030204" pitchFamily="18" charset="0"/>
+                            </a:rPr>
+                            <m:t>𝐿</m:t>
+                          </m:r>
+                        </m:e>
+                        <m:sub>
+                          <m:r>
+                            <a:rPr lang="en-US" sz="3200" b="0" i="1" dirty="0" smtClean="0">
+                              <a:latin typeface="Cambria Math" panose="02040503050406030204" pitchFamily="18" charset="0"/>
+                            </a:rPr>
+                            <m:t>2</m:t>
+                          </m:r>
+                        </m:sub>
+                      </m:sSub>
+                    </m:oMath>
+                  </m:oMathPara>
+                </a14:m>
+                <a:endParaRPr lang="en-US" sz="3200" dirty="0"/>
+              </a:p>
+            </p:txBody>
+          </p:sp>
+        </mc:Choice>
+        <mc:Fallback>
+          <p:sp>
+            <p:nvSpPr>
+              <p:cNvPr id="80" name="TextBox 79"/>
+              <p:cNvSpPr txBox="1">
+                <a:spLocks noRot="1" noChangeAspect="1" noMove="1" noResize="1" noEditPoints="1" noAdjustHandles="1" noChangeArrowheads="1" noChangeShapeType="1" noTextEdit="1"/>
+              </p:cNvSpPr>
+              <p:nvPr/>
+            </p:nvSpPr>
+            <p:spPr>
+              <a:xfrm>
+                <a:off x="6400800" y="4292025"/>
+                <a:ext cx="533400" cy="584775"/>
+              </a:xfrm>
+              <a:prstGeom prst="rect">
+                <a:avLst/>
+              </a:prstGeom>
+              <a:blipFill rotWithShape="0">
+                <a:blip r:embed="rId12"/>
+                <a:stretch>
+                  <a:fillRect/>
+                </a:stretch>
+              </a:blipFill>
+            </p:spPr>
+            <p:txBody>
+              <a:bodyPr/>
+              <a:lstStyle/>
+              <a:p>
+                <a:r>
+                  <a:rPr lang="en-US">
+                    <a:noFill/>
+                  </a:rPr>
+                  <a:t> </a:t>
+                </a:r>
+              </a:p>
+            </p:txBody>
+          </p:sp>
+        </mc:Fallback>
+      </mc:AlternateContent>
+      <p:sp>
+        <p:nvSpPr>
+          <p:cNvPr id="83" name="TextBox 82"/>
+          <p:cNvSpPr txBox="1"/>
+          <p:nvPr/>
+        </p:nvSpPr>
+        <p:spPr>
+          <a:xfrm>
+            <a:off x="2201230" y="4785602"/>
+            <a:ext cx="1832175" cy="369332"/>
+          </a:xfrm>
+          <a:prstGeom prst="rect">
+            <a:avLst/>
+          </a:prstGeom>
+          <a:noFill/>
+        </p:spPr>
+        <p:txBody>
+          <a:bodyPr wrap="square" rtlCol="0">
+            <a:spAutoFit/>
+          </a:bodyPr>
+          <a:lstStyle/>
+          <a:p>
+            <a:r>
+              <a:rPr lang="en-US" dirty="0"/>
+              <a:t>E</a:t>
+            </a:r>
+            <a:r>
+              <a:rPr lang="en-US" dirty="0" smtClean="0"/>
+              <a:t>xpansion</a:t>
+            </a:r>
+            <a:endParaRPr lang="en-US" dirty="0"/>
+          </a:p>
+        </p:txBody>
+      </p:sp>
+      <p:cxnSp>
+        <p:nvCxnSpPr>
+          <p:cNvPr id="85" name="Straight Arrow Connector 84"/>
+          <p:cNvCxnSpPr/>
+          <p:nvPr/>
+        </p:nvCxnSpPr>
+        <p:spPr>
+          <a:xfrm>
+            <a:off x="3429000" y="4970268"/>
+            <a:ext cx="1229412" cy="0"/>
+          </a:xfrm>
+          <a:prstGeom prst="straightConnector1">
+            <a:avLst/>
+          </a:prstGeom>
+          <a:ln w="28575">
+            <a:tailEnd type="triangle"/>
+          </a:ln>
+        </p:spPr>
+        <p:style>
+          <a:lnRef idx="1">
+            <a:schemeClr val="accent1"/>
+          </a:lnRef>
+          <a:fillRef idx="0">
+            <a:schemeClr val="accent1"/>
+          </a:fillRef>
+          <a:effectRef idx="0">
+            <a:schemeClr val="accent1"/>
+          </a:effectRef>
+          <a:fontRef idx="minor">
+            <a:schemeClr val="tx1"/>
+          </a:fontRef>
+        </p:style>
+      </p:cxnSp>
+      <p:sp>
+        <p:nvSpPr>
+          <p:cNvPr id="87" name="Curved Up Arrow 86"/>
+          <p:cNvSpPr/>
+          <p:nvPr/>
+        </p:nvSpPr>
+        <p:spPr>
+          <a:xfrm>
+            <a:off x="3276600" y="4038600"/>
+            <a:ext cx="1004231" cy="369333"/>
+          </a:xfrm>
+          <a:prstGeom prst="curvedUpArrow">
+            <a:avLst/>
+          </a:prstGeom>
+        </p:spPr>
+        <p:style>
+          <a:lnRef idx="2">
+            <a:schemeClr val="accent1">
+              <a:shade val="50000"/>
+            </a:schemeClr>
+          </a:lnRef>
+          <a:fillRef idx="1">
+            <a:schemeClr val="accent1"/>
+          </a:fillRef>
+          <a:effectRef idx="0">
+            <a:schemeClr val="accent1"/>
+          </a:effectRef>
+          <a:fontRef idx="minor">
+            <a:schemeClr val="lt1"/>
+          </a:fontRef>
+        </p:style>
+        <p:txBody>
+          <a:bodyPr rtlCol="0" anchor="ctr"/>
+          <a:lstStyle/>
+          <a:p>
+            <a:pPr algn="ctr"/>
+            <a:endParaRPr lang="en-US">
+              <a:solidFill>
+                <a:schemeClr val="tx1"/>
+              </a:solidFill>
+            </a:endParaRPr>
+          </a:p>
+        </p:txBody>
+      </p:sp>
+      <p:sp>
+        <p:nvSpPr>
+          <p:cNvPr id="88" name="Curved Up Arrow 87"/>
+          <p:cNvSpPr/>
+          <p:nvPr/>
+        </p:nvSpPr>
+        <p:spPr>
+          <a:xfrm>
+            <a:off x="4321681" y="4058572"/>
+            <a:ext cx="851831" cy="369333"/>
+          </a:xfrm>
+          <a:prstGeom prst="curvedUpArrow">
+            <a:avLst/>
+          </a:prstGeom>
+        </p:spPr>
+        <p:style>
+          <a:lnRef idx="2">
+            <a:schemeClr val="accent1">
+              <a:shade val="50000"/>
+            </a:schemeClr>
+          </a:lnRef>
+          <a:fillRef idx="1">
+            <a:schemeClr val="accent1"/>
+          </a:fillRef>
+          <a:effectRef idx="0">
+            <a:schemeClr val="accent1"/>
+          </a:effectRef>
+          <a:fontRef idx="minor">
+            <a:schemeClr val="lt1"/>
+          </a:fontRef>
+        </p:style>
+        <p:txBody>
+          <a:bodyPr rtlCol="0" anchor="ctr"/>
+          <a:lstStyle/>
+          <a:p>
+            <a:pPr algn="ctr"/>
+            <a:endParaRPr lang="en-US">
+              <a:solidFill>
+                <a:schemeClr val="tx1"/>
+              </a:solidFill>
+            </a:endParaRPr>
+          </a:p>
+        </p:txBody>
+      </p:sp>
+      <p:sp>
+        <p:nvSpPr>
+          <p:cNvPr id="89" name="Curved Up Arrow 88"/>
+          <p:cNvSpPr/>
+          <p:nvPr/>
+        </p:nvSpPr>
+        <p:spPr>
+          <a:xfrm>
+            <a:off x="5199629" y="4037345"/>
+            <a:ext cx="777492" cy="369333"/>
+          </a:xfrm>
+          <a:prstGeom prst="curvedUpArrow">
+            <a:avLst/>
+          </a:prstGeom>
+        </p:spPr>
+        <p:style>
+          <a:lnRef idx="2">
+            <a:schemeClr val="accent1">
+              <a:shade val="50000"/>
+            </a:schemeClr>
+          </a:lnRef>
+          <a:fillRef idx="1">
+            <a:schemeClr val="accent1"/>
+          </a:fillRef>
+          <a:effectRef idx="0">
+            <a:schemeClr val="accent1"/>
+          </a:effectRef>
+          <a:fontRef idx="minor">
+            <a:schemeClr val="lt1"/>
+          </a:fontRef>
+        </p:style>
+        <p:txBody>
+          <a:bodyPr rtlCol="0" anchor="ctr"/>
+          <a:lstStyle/>
+          <a:p>
+            <a:pPr algn="ctr"/>
+            <a:endParaRPr lang="en-US">
+              <a:solidFill>
+                <a:schemeClr val="tx1"/>
+              </a:solidFill>
+            </a:endParaRPr>
+          </a:p>
+        </p:txBody>
+      </p:sp>
+      <p:sp>
+        <p:nvSpPr>
+          <p:cNvPr id="90" name="Curved Up Arrow 89"/>
+          <p:cNvSpPr/>
+          <p:nvPr/>
+        </p:nvSpPr>
+        <p:spPr>
+          <a:xfrm>
+            <a:off x="6051459" y="4058572"/>
+            <a:ext cx="622663" cy="369333"/>
+          </a:xfrm>
+          <a:prstGeom prst="curvedUpArrow">
+            <a:avLst/>
+          </a:prstGeom>
+        </p:spPr>
+        <p:style>
+          <a:lnRef idx="2">
+            <a:schemeClr val="accent1">
+              <a:shade val="50000"/>
+            </a:schemeClr>
+          </a:lnRef>
+          <a:fillRef idx="1">
+            <a:schemeClr val="accent1"/>
+          </a:fillRef>
+          <a:effectRef idx="0">
+            <a:schemeClr val="accent1"/>
+          </a:effectRef>
+          <a:fontRef idx="minor">
+            <a:schemeClr val="lt1"/>
+          </a:fontRef>
+        </p:style>
+        <p:txBody>
+          <a:bodyPr rtlCol="0" anchor="ctr"/>
+          <a:lstStyle/>
+          <a:p>
+            <a:pPr algn="ctr"/>
+            <a:endParaRPr lang="en-US">
+              <a:solidFill>
+                <a:schemeClr val="tx1"/>
+              </a:solidFill>
+            </a:endParaRPr>
+          </a:p>
+        </p:txBody>
+      </p:sp>
+      <p:sp>
+        <p:nvSpPr>
+          <p:cNvPr id="91" name="TextBox 90"/>
+          <p:cNvSpPr txBox="1"/>
+          <p:nvPr/>
+        </p:nvSpPr>
+        <p:spPr>
+          <a:xfrm>
+            <a:off x="6438743" y="2113441"/>
+            <a:ext cx="340150" cy="369332"/>
+          </a:xfrm>
+          <a:prstGeom prst="rect">
+            <a:avLst/>
+          </a:prstGeom>
+          <a:noFill/>
+        </p:spPr>
+        <p:txBody>
+          <a:bodyPr wrap="square" rtlCol="0">
+            <a:spAutoFit/>
+          </a:bodyPr>
+          <a:lstStyle/>
+          <a:p>
+            <a:r>
+              <a:rPr lang="en-US" dirty="0"/>
+              <a:t>S</a:t>
+            </a:r>
+          </a:p>
+        </p:txBody>
+      </p:sp>
+    </p:spTree>
+    <p:extLst>
+      <p:ext uri="{BB962C8B-B14F-4D97-AF65-F5344CB8AC3E}">
+        <p14:creationId xmlns:p14="http://schemas.microsoft.com/office/powerpoint/2010/main" val="4037492135"/>
+      </p:ext>
+    </p:extLst>
+  </p:cSld>
+  <p:clrMapOvr>
+    <a:masterClrMapping/>
+  </p:clrMapOvr>
+</p:sld>
+</file>
+
 <file path=ppt/theme/theme1.xml><?xml version="1.0" encoding="utf-8"?>
 <a:theme xmlns:a="http://schemas.openxmlformats.org/drawingml/2006/main" name="Office Theme">
   <a:themeElements>

</xml_diff>